<commit_message>
improved the PPT generation
</commit_message>
<xml_diff>
--- a/src/python/ccpn/util/pptxWriter/pptx_templates/Screening_report_template.pptx
+++ b/src/python/ccpn/util/pptxWriter/pptx_templates/Screening_report_template.pptx
@@ -220,7 +220,7 @@
           <a:p>
             <a:fld id="{F9EE9108-8403-9346-994C-754CE975162E}" type="datetimeFigureOut">
               <a:rPr lang="en-GB" smtClean="0"/>
-              <a:t>13/12/2024</a:t>
+              <a:t>18/12/2024</a:t>
             </a:fld>
             <a:endParaRPr lang="en-GB"/>
           </a:p>
@@ -376,7 +376,7 @@
           <a:p>
             <a:fld id="{11AF75C9-0359-FC42-A307-982A28152EDC}" type="datetimeFigureOut">
               <a:rPr lang="en-US" smtClean="0"/>
-              <a:t>12/13/24</a:t>
+              <a:t>12/18/24</a:t>
             </a:fld>
             <a:r>
               <a:rPr lang="en-US" dirty="0"/>
@@ -794,24 +794,24 @@
       </p:sp>
       <p:sp>
         <p:nvSpPr>
-          <p:cNvPr id="2" name="Subtitle">
-            <a:extLst>
-              <a:ext uri="{FF2B5EF4-FFF2-40B4-BE49-F238E27FC236}">
-                <a16:creationId xmlns:a16="http://schemas.microsoft.com/office/drawing/2014/main" id="{F4CAA4E1-25C2-ED7D-258C-369A21CE21D1}"/>
-              </a:ext>
-            </a:extLst>
-          </p:cNvPr>
-          <p:cNvSpPr>
-            <a:spLocks noGrp="1"/>
-          </p:cNvSpPr>
-          <p:nvPr>
-            <p:ph type="body" sz="quarter" idx="20" hasCustomPrompt="1"/>
-          </p:nvPr>
-        </p:nvSpPr>
-        <p:spPr>
-          <a:xfrm>
-            <a:off x="233361" y="604921"/>
-            <a:ext cx="11318420" cy="325044"/>
+          <p:cNvPr id="7" name="Title">
+            <a:extLst>
+              <a:ext uri="{FF2B5EF4-FFF2-40B4-BE49-F238E27FC236}">
+                <a16:creationId xmlns:a16="http://schemas.microsoft.com/office/drawing/2014/main" id="{2AA5CEA3-0605-F544-5964-0560B900D732}"/>
+              </a:ext>
+            </a:extLst>
+          </p:cNvPr>
+          <p:cNvSpPr>
+            <a:spLocks noGrp="1"/>
+          </p:cNvSpPr>
+          <p:nvPr>
+            <p:ph type="body" sz="quarter" idx="26" hasCustomPrompt="1"/>
+          </p:nvPr>
+        </p:nvSpPr>
+        <p:spPr>
+          <a:xfrm>
+            <a:off x="233361" y="66675"/>
+            <a:ext cx="11318420" cy="471247"/>
           </a:xfrm>
         </p:spPr>
         <p:txBody>
@@ -819,50 +819,7 @@
             <a:noAutofit/>
           </a:bodyPr>
           <a:lstStyle>
-            <a:lvl1pPr marL="0" indent="0" algn="l">
-              <a:buNone/>
-              <a:defRPr sz="1400">
-                <a:latin typeface="Helvetica" pitchFamily="2" charset="0"/>
-              </a:defRPr>
-            </a:lvl1pPr>
-          </a:lstStyle>
-          <a:p>
-            <a:pPr lvl="0"/>
-            <a:r>
-              <a:rPr lang="en-US" dirty="0"/>
-              <a:t>Subtitle</a:t>
-            </a:r>
-          </a:p>
-        </p:txBody>
-      </p:sp>
-      <p:sp>
-        <p:nvSpPr>
-          <p:cNvPr id="14" name="Title">
-            <a:extLst>
-              <a:ext uri="{FF2B5EF4-FFF2-40B4-BE49-F238E27FC236}">
-                <a16:creationId xmlns:a16="http://schemas.microsoft.com/office/drawing/2014/main" id="{9463F719-8AB4-F1D1-782B-27EBE722CF72}"/>
-              </a:ext>
-            </a:extLst>
-          </p:cNvPr>
-          <p:cNvSpPr>
-            <a:spLocks noGrp="1"/>
-          </p:cNvSpPr>
-          <p:nvPr>
-            <p:ph type="body" sz="quarter" idx="26" hasCustomPrompt="1"/>
-          </p:nvPr>
-        </p:nvSpPr>
-        <p:spPr>
-          <a:xfrm>
-            <a:off x="233361" y="245822"/>
-            <a:ext cx="11318420" cy="292100"/>
-          </a:xfrm>
-        </p:spPr>
-        <p:txBody>
-          <a:bodyPr anchor="ctr">
-            <a:noAutofit/>
-          </a:bodyPr>
-          <a:lstStyle>
-            <a:lvl1pPr marL="0" indent="0" algn="l">
+            <a:lvl1pPr marL="0" indent="0" algn="ctr">
               <a:buNone/>
               <a:defRPr sz="2400" b="1">
                 <a:solidFill>
@@ -877,6 +834,52 @@
             <a:r>
               <a:rPr lang="en-GB" dirty="0"/>
               <a:t>Title</a:t>
+            </a:r>
+          </a:p>
+        </p:txBody>
+      </p:sp>
+      <p:sp>
+        <p:nvSpPr>
+          <p:cNvPr id="9" name="Subtitle">
+            <a:extLst>
+              <a:ext uri="{FF2B5EF4-FFF2-40B4-BE49-F238E27FC236}">
+                <a16:creationId xmlns:a16="http://schemas.microsoft.com/office/drawing/2014/main" id="{31DD0E48-ACFD-380E-2CF4-8588EEF8FC2F}"/>
+              </a:ext>
+            </a:extLst>
+          </p:cNvPr>
+          <p:cNvSpPr>
+            <a:spLocks noGrp="1"/>
+          </p:cNvSpPr>
+          <p:nvPr>
+            <p:ph type="body" sz="quarter" idx="27" hasCustomPrompt="1"/>
+          </p:nvPr>
+        </p:nvSpPr>
+        <p:spPr>
+          <a:xfrm>
+            <a:off x="233137" y="559332"/>
+            <a:ext cx="11318420" cy="426636"/>
+          </a:xfrm>
+        </p:spPr>
+        <p:txBody>
+          <a:bodyPr anchor="ctr">
+            <a:normAutofit/>
+          </a:bodyPr>
+          <a:lstStyle>
+            <a:lvl1pPr marL="0" indent="0" algn="ctr">
+              <a:buNone/>
+              <a:defRPr sz="1400">
+                <a:solidFill>
+                  <a:srgbClr val="2E705C"/>
+                </a:solidFill>
+                <a:latin typeface="Helvetica" pitchFamily="2" charset="0"/>
+              </a:defRPr>
+            </a:lvl1pPr>
+          </a:lstStyle>
+          <a:p>
+            <a:pPr lvl="0"/>
+            <a:r>
+              <a:rPr lang="en-GB" dirty="0"/>
+              <a:t>Subtitle</a:t>
             </a:r>
           </a:p>
         </p:txBody>
@@ -955,7 +958,7 @@
           <a:p>
             <a:fld id="{11AF75C9-0359-FC42-A307-982A28152EDC}" type="datetimeFigureOut">
               <a:rPr lang="en-US" smtClean="0"/>
-              <a:t>12/13/24</a:t>
+              <a:t>12/18/24</a:t>
             </a:fld>
             <a:r>
               <a:rPr lang="en-US" dirty="0"/>
@@ -1053,7 +1056,7 @@
         </p:nvSpPr>
         <p:spPr>
           <a:xfrm>
-            <a:off x="7504980" y="5610225"/>
+            <a:off x="7504980" y="5695950"/>
             <a:ext cx="4042947" cy="568644"/>
           </a:xfrm>
         </p:spPr>
@@ -1112,7 +1115,7 @@
         </p:nvSpPr>
         <p:spPr>
           <a:xfrm>
-            <a:off x="233129" y="1380069"/>
+            <a:off x="233129" y="1465794"/>
             <a:ext cx="7196145" cy="4798800"/>
           </a:xfrm>
         </p:spPr>
@@ -1152,7 +1155,7 @@
         </p:nvSpPr>
         <p:spPr>
           <a:xfrm>
-            <a:off x="7504980" y="476091"/>
+            <a:off x="7504980" y="561816"/>
             <a:ext cx="4042947" cy="1751012"/>
           </a:xfrm>
         </p:spPr>
@@ -1204,7 +1207,7 @@
         </p:nvSpPr>
         <p:spPr>
           <a:xfrm>
-            <a:off x="7504980" y="2249747"/>
+            <a:off x="7504980" y="2335472"/>
             <a:ext cx="4042947" cy="3360477"/>
           </a:xfrm>
         </p:spPr>
@@ -1260,7 +1263,7 @@
         </p:nvSpPr>
         <p:spPr>
           <a:xfrm>
-            <a:off x="233137" y="473606"/>
+            <a:off x="233137" y="559331"/>
             <a:ext cx="7196137" cy="906463"/>
           </a:xfrm>
         </p:spPr>
@@ -1290,34 +1293,34 @@
       </p:sp>
       <p:sp>
         <p:nvSpPr>
-          <p:cNvPr id="4" name="Title">
-            <a:extLst>
-              <a:ext uri="{FF2B5EF4-FFF2-40B4-BE49-F238E27FC236}">
-                <a16:creationId xmlns:a16="http://schemas.microsoft.com/office/drawing/2014/main" id="{7572B60D-C309-6B1C-79AE-BC7018BD02A3}"/>
-              </a:ext>
-            </a:extLst>
-          </p:cNvPr>
-          <p:cNvSpPr>
-            <a:spLocks noGrp="1"/>
-          </p:cNvSpPr>
-          <p:nvPr>
-            <p:ph type="body" sz="quarter" idx="28" hasCustomPrompt="1"/>
-          </p:nvPr>
-        </p:nvSpPr>
-        <p:spPr>
-          <a:xfrm>
-            <a:off x="233363" y="0"/>
-            <a:ext cx="11314112" cy="473075"/>
-          </a:xfrm>
-        </p:spPr>
-        <p:txBody>
-          <a:bodyPr wrap="none" anchor="ctr">
+          <p:cNvPr id="2" name="Title">
+            <a:extLst>
+              <a:ext uri="{FF2B5EF4-FFF2-40B4-BE49-F238E27FC236}">
+                <a16:creationId xmlns:a16="http://schemas.microsoft.com/office/drawing/2014/main" id="{9279AAA2-4FB3-C05A-6F5E-EB3C445BDFDB}"/>
+              </a:ext>
+            </a:extLst>
+          </p:cNvPr>
+          <p:cNvSpPr>
+            <a:spLocks noGrp="1"/>
+          </p:cNvSpPr>
+          <p:nvPr>
+            <p:ph type="body" sz="quarter" idx="26" hasCustomPrompt="1"/>
+          </p:nvPr>
+        </p:nvSpPr>
+        <p:spPr>
+          <a:xfrm>
+            <a:off x="233361" y="66675"/>
+            <a:ext cx="11318420" cy="471247"/>
+          </a:xfrm>
+        </p:spPr>
+        <p:txBody>
+          <a:bodyPr anchor="ctr">
             <a:noAutofit/>
           </a:bodyPr>
           <a:lstStyle>
             <a:lvl1pPr marL="0" indent="0" algn="ctr">
               <a:buNone/>
-              <a:defRPr b="1">
+              <a:defRPr sz="2400" b="1">
                 <a:solidFill>
                   <a:srgbClr val="0B4E83"/>
                 </a:solidFill>
@@ -1533,7 +1536,7 @@
           <a:p>
             <a:fld id="{11AF75C9-0359-FC42-A307-982A28152EDC}" type="datetimeFigureOut">
               <a:rPr lang="en-US" smtClean="0"/>
-              <a:t>12/13/24</a:t>
+              <a:t>12/18/24</a:t>
             </a:fld>
             <a:endParaRPr lang="en-US"/>
           </a:p>

</xml_diff>

<commit_message>
improved rounding and formated subtitle for screening report ppt
</commit_message>
<xml_diff>
--- a/src/python/ccpn/util/pptxWriter/pptx_templates/Screening_report_template.pptx
+++ b/src/python/ccpn/util/pptxWriter/pptx_templates/Screening_report_template.pptx
@@ -1056,8 +1056,8 @@
         </p:nvSpPr>
         <p:spPr>
           <a:xfrm>
-            <a:off x="7504980" y="5695950"/>
-            <a:ext cx="4042947" cy="568644"/>
+            <a:off x="7504980" y="5908302"/>
+            <a:ext cx="4042947" cy="356291"/>
           </a:xfrm>
         </p:spPr>
         <p:txBody>
@@ -1115,8 +1115,8 @@
         </p:nvSpPr>
         <p:spPr>
           <a:xfrm>
-            <a:off x="233129" y="1465794"/>
-            <a:ext cx="7196145" cy="4798800"/>
+            <a:off x="233137" y="1011050"/>
+            <a:ext cx="7196145" cy="5253543"/>
           </a:xfrm>
         </p:spPr>
         <p:txBody>
@@ -1155,7 +1155,7 @@
         </p:nvSpPr>
         <p:spPr>
           <a:xfrm>
-            <a:off x="7504980" y="561816"/>
+            <a:off x="7504979" y="981708"/>
             <a:ext cx="4042947" cy="1751012"/>
           </a:xfrm>
         </p:spPr>
@@ -1207,8 +1207,8 @@
         </p:nvSpPr>
         <p:spPr>
           <a:xfrm>
-            <a:off x="7504980" y="2335472"/>
-            <a:ext cx="4042947" cy="3360477"/>
+            <a:off x="7504980" y="2736980"/>
+            <a:ext cx="4042947" cy="3171322"/>
           </a:xfrm>
         </p:spPr>
         <p:txBody>
@@ -1247,52 +1247,6 @@
       </p:sp>
       <p:sp>
         <p:nvSpPr>
-          <p:cNvPr id="3" name="Subtitle">
-            <a:extLst>
-              <a:ext uri="{FF2B5EF4-FFF2-40B4-BE49-F238E27FC236}">
-                <a16:creationId xmlns:a16="http://schemas.microsoft.com/office/drawing/2014/main" id="{21D0C4B9-E1B7-EB6E-4E7C-32C3CCB63A0B}"/>
-              </a:ext>
-            </a:extLst>
-          </p:cNvPr>
-          <p:cNvSpPr>
-            <a:spLocks noGrp="1"/>
-          </p:cNvSpPr>
-          <p:nvPr>
-            <p:ph type="body" sz="quarter" idx="27" hasCustomPrompt="1"/>
-          </p:nvPr>
-        </p:nvSpPr>
-        <p:spPr>
-          <a:xfrm>
-            <a:off x="233137" y="559331"/>
-            <a:ext cx="7196137" cy="906463"/>
-          </a:xfrm>
-        </p:spPr>
-        <p:txBody>
-          <a:bodyPr anchor="ctr">
-            <a:normAutofit/>
-          </a:bodyPr>
-          <a:lstStyle>
-            <a:lvl1pPr marL="0" indent="0">
-              <a:buNone/>
-              <a:defRPr sz="1200">
-                <a:solidFill>
-                  <a:srgbClr val="2E705C"/>
-                </a:solidFill>
-                <a:latin typeface="Helvetica" pitchFamily="2" charset="0"/>
-              </a:defRPr>
-            </a:lvl1pPr>
-          </a:lstStyle>
-          <a:p>
-            <a:pPr lvl="0"/>
-            <a:r>
-              <a:rPr lang="en-GB" dirty="0"/>
-              <a:t>Subtitle</a:t>
-            </a:r>
-          </a:p>
-        </p:txBody>
-      </p:sp>
-      <p:sp>
-        <p:nvSpPr>
           <p:cNvPr id="2" name="Title">
             <a:extLst>
               <a:ext uri="{FF2B5EF4-FFF2-40B4-BE49-F238E27FC236}">
@@ -1333,6 +1287,52 @@
             <a:r>
               <a:rPr lang="en-GB" dirty="0"/>
               <a:t>Title</a:t>
+            </a:r>
+          </a:p>
+        </p:txBody>
+      </p:sp>
+      <p:sp>
+        <p:nvSpPr>
+          <p:cNvPr id="4" name="Subtitle">
+            <a:extLst>
+              <a:ext uri="{FF2B5EF4-FFF2-40B4-BE49-F238E27FC236}">
+                <a16:creationId xmlns:a16="http://schemas.microsoft.com/office/drawing/2014/main" id="{570C5144-83F6-8E9B-17B1-DD06E41A4FF9}"/>
+              </a:ext>
+            </a:extLst>
+          </p:cNvPr>
+          <p:cNvSpPr>
+            <a:spLocks noGrp="1"/>
+          </p:cNvSpPr>
+          <p:nvPr>
+            <p:ph type="body" sz="quarter" idx="28" hasCustomPrompt="1"/>
+          </p:nvPr>
+        </p:nvSpPr>
+        <p:spPr>
+          <a:xfrm>
+            <a:off x="233137" y="559332"/>
+            <a:ext cx="11318420" cy="426636"/>
+          </a:xfrm>
+        </p:spPr>
+        <p:txBody>
+          <a:bodyPr anchor="ctr">
+            <a:normAutofit/>
+          </a:bodyPr>
+          <a:lstStyle>
+            <a:lvl1pPr marL="0" indent="0" algn="ctr">
+              <a:buNone/>
+              <a:defRPr sz="1400">
+                <a:solidFill>
+                  <a:srgbClr val="2E705C"/>
+                </a:solidFill>
+                <a:latin typeface="Helvetica" pitchFamily="2" charset="0"/>
+              </a:defRPr>
+            </a:lvl1pPr>
+          </a:lstStyle>
+          <a:p>
+            <a:pPr lvl="0"/>
+            <a:r>
+              <a:rPr lang="en-GB" dirty="0"/>
+              <a:t>Subtitle</a:t>
             </a:r>
           </a:p>
         </p:txBody>

</xml_diff>